<commit_message>
Changed coloring in pptx, added png of pipeline
</commit_message>
<xml_diff>
--- a/random-processing.pptx
+++ b/random-processing.pptx
@@ -104,6 +104,11 @@
       </a:defRPr>
     </a:lvl9pPr>
   </p:defaultTextStyle>
+  <p:extLst>
+    <p:ext uri="{EFAFB233-063F-42B5-8137-9DF3F51BA10A}">
+      <p15:sldGuideLst xmlns:p15="http://schemas.microsoft.com/office/powerpoint/2012/main"/>
+    </p:ext>
+  </p:extLst>
 </p:presentation>
 </file>
 
@@ -3780,7 +3785,7 @@
           </a:prstGeom>
           <a:ln>
             <a:solidFill>
-              <a:srgbClr val="92D050"/>
+              <a:srgbClr val="00B050"/>
             </a:solidFill>
             <a:tailEnd type="triangle"/>
           </a:ln>
@@ -3818,7 +3823,7 @@
           </a:prstGeom>
           <a:ln>
             <a:solidFill>
-              <a:srgbClr val="92D050"/>
+              <a:srgbClr val="0070C0"/>
             </a:solidFill>
             <a:tailEnd type="triangle"/>
           </a:ln>
@@ -3856,7 +3861,7 @@
           </a:prstGeom>
           <a:ln>
             <a:solidFill>
-              <a:srgbClr val="92D050"/>
+              <a:srgbClr val="002060"/>
             </a:solidFill>
             <a:tailEnd type="triangle"/>
           </a:ln>

</xml_diff>